<commit_message>
method ... nearly done
</commit_message>
<xml_diff>
--- a/1351040_1351030.pptx
+++ b/1351040_1351030.pptx
@@ -14,6 +14,8 @@
     <p:sldId id="262" r:id="rId8"/>
     <p:sldId id="263" r:id="rId9"/>
     <p:sldId id="264" r:id="rId10"/>
+    <p:sldId id="265" r:id="rId11"/>
+    <p:sldId id="266" r:id="rId12"/>
   </p:sldIdLst>
   <p:sldSz cx="12192000" cy="6858000"/>
   <p:notesSz cx="6858000" cy="9144000"/>
@@ -304,7 +306,7 @@
             <a:fld id="{1E700B27-DE4C-4B9E-BB11-B9027034A00F}" type="datetimeFigureOut">
               <a:rPr lang="en-US" smtClean="0"/>
               <a:pPr/>
-              <a:t>8/14/2015</a:t>
+              <a:t>8/16/2015</a:t>
             </a:fld>
             <a:endParaRPr lang="en-US" dirty="0"/>
           </a:p>
@@ -585,7 +587,7 @@
           <a:p>
             <a:fld id="{C40F4739-9812-4A9F-890D-2AD6BA5F6EE8}" type="datetimeFigureOut">
               <a:rPr lang="en-US" smtClean="0"/>
-              <a:t>8/14/2015</a:t>
+              <a:t>8/16/2015</a:t>
             </a:fld>
             <a:endParaRPr lang="en-US" dirty="0"/>
           </a:p>
@@ -785,7 +787,7 @@
           <a:p>
             <a:fld id="{18845AC5-A3F8-44AA-BA8F-596CDCC976D3}" type="datetimeFigureOut">
               <a:rPr lang="en-US" smtClean="0"/>
-              <a:t>8/14/2015</a:t>
+              <a:t>8/16/2015</a:t>
             </a:fld>
             <a:endParaRPr lang="en-US" dirty="0"/>
           </a:p>
@@ -1059,7 +1061,7 @@
           <a:p>
             <a:fld id="{C873B183-A821-4095-A363-9EC968635539}" type="datetimeFigureOut">
               <a:rPr lang="en-US" smtClean="0"/>
-              <a:t>8/14/2015</a:t>
+              <a:t>8/16/2015</a:t>
             </a:fld>
             <a:endParaRPr lang="en-US" dirty="0"/>
           </a:p>
@@ -1397,7 +1399,7 @@
           <a:p>
             <a:fld id="{174D01B4-0AA5-45E6-B2E6-5FA4078AEBCF}" type="datetimeFigureOut">
               <a:rPr lang="en-US" smtClean="0"/>
-              <a:t>8/14/2015</a:t>
+              <a:t>8/16/2015</a:t>
             </a:fld>
             <a:endParaRPr lang="en-US" dirty="0"/>
           </a:p>
@@ -2013,7 +2015,7 @@
           <a:p>
             <a:fld id="{7E0D914D-B099-4142-A885-11F276715148}" type="datetimeFigureOut">
               <a:rPr lang="en-US" smtClean="0"/>
-              <a:t>8/14/2015</a:t>
+              <a:t>8/16/2015</a:t>
             </a:fld>
             <a:endParaRPr lang="en-US" dirty="0"/>
           </a:p>
@@ -2867,7 +2869,7 @@
           <a:p>
             <a:fld id="{7E0D914D-B099-4142-A885-11F276715148}" type="datetimeFigureOut">
               <a:rPr lang="en-US" smtClean="0"/>
-              <a:t>8/14/2015</a:t>
+              <a:t>8/16/2015</a:t>
             </a:fld>
             <a:endParaRPr lang="en-US" dirty="0"/>
           </a:p>
@@ -3044,7 +3046,7 @@
           <a:p>
             <a:fld id="{80DBE609-F3F2-45E6-BD6A-E03A8C86C1AE}" type="datetimeFigureOut">
               <a:rPr lang="en-US" smtClean="0"/>
-              <a:t>8/14/2015</a:t>
+              <a:t>8/16/2015</a:t>
             </a:fld>
             <a:endParaRPr lang="en-US" dirty="0"/>
           </a:p>
@@ -3230,7 +3232,7 @@
           <a:p>
             <a:fld id="{7A24AD68-089C-4467-A8F3-EA2BBCA6B44E}" type="datetimeFigureOut">
               <a:rPr lang="en-US" smtClean="0"/>
-              <a:t>8/14/2015</a:t>
+              <a:t>8/16/2015</a:t>
             </a:fld>
             <a:endParaRPr lang="en-US" dirty="0"/>
           </a:p>
@@ -3406,7 +3408,7 @@
           <a:p>
             <a:fld id="{75C51FCE-E4BB-4680-8E50-3C0E348D2609}" type="datetimeFigureOut">
               <a:rPr lang="en-US" smtClean="0"/>
-              <a:t>8/14/2015</a:t>
+              <a:t>8/16/2015</a:t>
             </a:fld>
             <a:endParaRPr lang="en-US" dirty="0"/>
           </a:p>
@@ -3656,7 +3658,7 @@
           <a:p>
             <a:fld id="{8AAA073D-A903-47F8-8D16-77642FB0DF1F}" type="datetimeFigureOut">
               <a:rPr lang="en-US" smtClean="0"/>
-              <a:t>8/14/2015</a:t>
+              <a:t>8/16/2015</a:t>
             </a:fld>
             <a:endParaRPr lang="en-US" dirty="0"/>
           </a:p>
@@ -3954,7 +3956,7 @@
           <a:p>
             <a:fld id="{AB91FA40-626B-4CA1-85D0-7A9016E395BA}" type="datetimeFigureOut">
               <a:rPr lang="en-US" smtClean="0"/>
-              <a:t>8/14/2015</a:t>
+              <a:t>8/16/2015</a:t>
             </a:fld>
             <a:endParaRPr lang="en-US" dirty="0"/>
           </a:p>
@@ -4398,7 +4400,7 @@
           <a:p>
             <a:fld id="{C3F425EA-B9DC-48A7-991E-9A82573B1B21}" type="datetimeFigureOut">
               <a:rPr lang="en-US" smtClean="0"/>
-              <a:t>8/14/2015</a:t>
+              <a:t>8/16/2015</a:t>
             </a:fld>
             <a:endParaRPr lang="en-US" dirty="0"/>
           </a:p>
@@ -4522,7 +4524,7 @@
           <a:p>
             <a:fld id="{66CB97F8-6CEB-469B-AFCC-889F2A2B1D5A}" type="datetimeFigureOut">
               <a:rPr lang="en-US" smtClean="0"/>
-              <a:t>8/14/2015</a:t>
+              <a:t>8/16/2015</a:t>
             </a:fld>
             <a:endParaRPr lang="en-US" dirty="0"/>
           </a:p>
@@ -4623,7 +4625,7 @@
           <a:p>
             <a:fld id="{8FA9179F-009E-4FA5-B091-7EBB82A185BD}" type="datetimeFigureOut">
               <a:rPr lang="en-US" smtClean="0"/>
-              <a:t>8/14/2015</a:t>
+              <a:t>8/16/2015</a:t>
             </a:fld>
             <a:endParaRPr lang="en-US" dirty="0"/>
           </a:p>
@@ -4908,7 +4910,7 @@
           <a:p>
             <a:fld id="{8E665CEB-0076-4E37-B880-BCEA9784DE0A}" type="datetimeFigureOut">
               <a:rPr lang="en-US" smtClean="0"/>
-              <a:t>8/14/2015</a:t>
+              <a:t>8/16/2015</a:t>
             </a:fld>
             <a:endParaRPr lang="en-US" dirty="0"/>
           </a:p>
@@ -5189,7 +5191,7 @@
           <a:p>
             <a:fld id="{A6149E5E-3896-4118-99A7-7B85668F1C5E}" type="datetimeFigureOut">
               <a:rPr lang="en-US" smtClean="0"/>
-              <a:t>8/14/2015</a:t>
+              <a:t>8/16/2015</a:t>
             </a:fld>
             <a:endParaRPr lang="en-US" dirty="0"/>
           </a:p>
@@ -5624,7 +5626,7 @@
           <a:p>
             <a:fld id="{7E0D914D-B099-4142-A885-11F276715148}" type="datetimeFigureOut">
               <a:rPr lang="en-US" smtClean="0"/>
-              <a:t>8/14/2015</a:t>
+              <a:t>8/16/2015</a:t>
             </a:fld>
             <a:endParaRPr lang="en-US" dirty="0"/>
           </a:p>
@@ -6198,6 +6200,148 @@
 </p:sld>
 </file>
 
+<file path=ppt/slides/slide10.xml><?xml version="1.0" encoding="utf-8"?>
+<p:sld xmlns:a="http://schemas.openxmlformats.org/drawingml/2006/main" xmlns:r="http://schemas.openxmlformats.org/officeDocument/2006/relationships" xmlns:p="http://schemas.openxmlformats.org/presentationml/2006/main">
+  <p:cSld>
+    <p:spTree>
+      <p:nvGrpSpPr>
+        <p:cNvPr id="1" name=""/>
+        <p:cNvGrpSpPr/>
+        <p:nvPr/>
+      </p:nvGrpSpPr>
+      <p:grpSpPr>
+        <a:xfrm>
+          <a:off x="0" y="0"/>
+          <a:ext cx="0" cy="0"/>
+          <a:chOff x="0" y="0"/>
+          <a:chExt cx="0" cy="0"/>
+        </a:xfrm>
+      </p:grpSpPr>
+      <p:sp>
+        <p:nvSpPr>
+          <p:cNvPr id="6" name="TextBox 5"/>
+          <p:cNvSpPr txBox="1"/>
+          <p:nvPr/>
+        </p:nvSpPr>
+        <p:spPr>
+          <a:xfrm>
+            <a:off x="1924050" y="2798345"/>
+            <a:ext cx="10070432" cy="2308324"/>
+          </a:xfrm>
+          <a:prstGeom prst="rect">
+            <a:avLst/>
+          </a:prstGeom>
+          <a:noFill/>
+        </p:spPr>
+        <p:txBody>
+          <a:bodyPr wrap="square" rtlCol="0">
+            <a:spAutoFit/>
+          </a:bodyPr>
+          <a:lstStyle/>
+          <a:p>
+            <a:r>
+              <a:rPr lang="en-US" sz="7200" dirty="0"/>
+              <a:t>III. METHODOLOGY</a:t>
+            </a:r>
+            <a:br>
+              <a:rPr lang="en-US" sz="7200" dirty="0"/>
+            </a:br>
+            <a:endParaRPr lang="en-US" sz="7200" dirty="0">
+              <a:solidFill>
+                <a:srgbClr val="FFFF00"/>
+              </a:solidFill>
+            </a:endParaRPr>
+          </a:p>
+        </p:txBody>
+      </p:sp>
+    </p:spTree>
+    <p:extLst>
+      <p:ext uri="{BB962C8B-B14F-4D97-AF65-F5344CB8AC3E}">
+        <p14:creationId xmlns:p14="http://schemas.microsoft.com/office/powerpoint/2010/main" val="1342850843"/>
+      </p:ext>
+    </p:extLst>
+  </p:cSld>
+  <p:clrMapOvr>
+    <a:masterClrMapping/>
+  </p:clrMapOvr>
+</p:sld>
+</file>
+
+<file path=ppt/slides/slide11.xml><?xml version="1.0" encoding="utf-8"?>
+<p:sld xmlns:a="http://schemas.openxmlformats.org/drawingml/2006/main" xmlns:r="http://schemas.openxmlformats.org/officeDocument/2006/relationships" xmlns:p="http://schemas.openxmlformats.org/presentationml/2006/main">
+  <p:cSld>
+    <p:spTree>
+      <p:nvGrpSpPr>
+        <p:cNvPr id="1" name=""/>
+        <p:cNvGrpSpPr/>
+        <p:nvPr/>
+      </p:nvGrpSpPr>
+      <p:grpSpPr>
+        <a:xfrm>
+          <a:off x="0" y="0"/>
+          <a:ext cx="0" cy="0"/>
+          <a:chOff x="0" y="0"/>
+          <a:chExt cx="0" cy="0"/>
+        </a:xfrm>
+      </p:grpSpPr>
+      <p:sp>
+        <p:nvSpPr>
+          <p:cNvPr id="4" name="TextBox 3"/>
+          <p:cNvSpPr txBox="1"/>
+          <p:nvPr/>
+        </p:nvSpPr>
+        <p:spPr>
+          <a:xfrm>
+            <a:off x="336884" y="264695"/>
+            <a:ext cx="10070432" cy="584775"/>
+          </a:xfrm>
+          <a:prstGeom prst="rect">
+            <a:avLst/>
+          </a:prstGeom>
+          <a:noFill/>
+        </p:spPr>
+        <p:txBody>
+          <a:bodyPr wrap="square" rtlCol="0">
+            <a:spAutoFit/>
+          </a:bodyPr>
+          <a:lstStyle/>
+          <a:p>
+            <a:r>
+              <a:rPr lang="en-US" sz="3200" dirty="0" smtClean="0">
+                <a:solidFill>
+                  <a:srgbClr val="FFFF00"/>
+                </a:solidFill>
+              </a:rPr>
+              <a:t>Methodology</a:t>
+            </a:r>
+            <a:endParaRPr lang="en-US" sz="3200" dirty="0">
+              <a:solidFill>
+                <a:srgbClr val="FFFF00"/>
+              </a:solidFill>
+            </a:endParaRPr>
+          </a:p>
+        </p:txBody>
+      </p:sp>
+    </p:spTree>
+    <p:extLst>
+      <p:ext uri="{BB962C8B-B14F-4D97-AF65-F5344CB8AC3E}">
+        <p14:creationId xmlns:p14="http://schemas.microsoft.com/office/powerpoint/2010/main" val="1586005300"/>
+      </p:ext>
+    </p:extLst>
+  </p:cSld>
+  <p:clrMapOvr>
+    <a:masterClrMapping/>
+  </p:clrMapOvr>
+  <p:timing>
+    <p:tnLst>
+      <p:par>
+        <p:cTn id="1" dur="indefinite" restart="never" nodeType="tmRoot"/>
+      </p:par>
+    </p:tnLst>
+  </p:timing>
+</p:sld>
+</file>
+
 <file path=ppt/slides/slide2.xml><?xml version="1.0" encoding="utf-8"?>
 <p:sld xmlns:a="http://schemas.openxmlformats.org/drawingml/2006/main" xmlns:r="http://schemas.openxmlformats.org/officeDocument/2006/relationships" xmlns:p="http://schemas.openxmlformats.org/presentationml/2006/main">
   <p:cSld>

</xml_diff>

<commit_message>
truoc khi sua 4 gio chieu thu 2
</commit_message>
<xml_diff>
--- a/1351040_1351030.pptx
+++ b/1351040_1351030.pptx
@@ -22,6 +22,7 @@
     <p:sldId id="273" r:id="rId16"/>
     <p:sldId id="274" r:id="rId17"/>
     <p:sldId id="269" r:id="rId18"/>
+    <p:sldId id="275" r:id="rId19"/>
   </p:sldIdLst>
   <p:sldSz cx="12192000" cy="6858000"/>
   <p:notesSz cx="6858000" cy="9144000"/>
@@ -312,7 +313,7 @@
             <a:fld id="{1E700B27-DE4C-4B9E-BB11-B9027034A00F}" type="datetimeFigureOut">
               <a:rPr lang="en-US" smtClean="0"/>
               <a:pPr/>
-              <a:t>8/16/2015</a:t>
+              <a:t>8/17/2015</a:t>
             </a:fld>
             <a:endParaRPr lang="en-US" dirty="0"/>
           </a:p>
@@ -593,7 +594,7 @@
           <a:p>
             <a:fld id="{C40F4739-9812-4A9F-890D-2AD6BA5F6EE8}" type="datetimeFigureOut">
               <a:rPr lang="en-US" smtClean="0"/>
-              <a:t>8/16/2015</a:t>
+              <a:t>8/17/2015</a:t>
             </a:fld>
             <a:endParaRPr lang="en-US" dirty="0"/>
           </a:p>
@@ -793,7 +794,7 @@
           <a:p>
             <a:fld id="{18845AC5-A3F8-44AA-BA8F-596CDCC976D3}" type="datetimeFigureOut">
               <a:rPr lang="en-US" smtClean="0"/>
-              <a:t>8/16/2015</a:t>
+              <a:t>8/17/2015</a:t>
             </a:fld>
             <a:endParaRPr lang="en-US" dirty="0"/>
           </a:p>
@@ -1067,7 +1068,7 @@
           <a:p>
             <a:fld id="{C873B183-A821-4095-A363-9EC968635539}" type="datetimeFigureOut">
               <a:rPr lang="en-US" smtClean="0"/>
-              <a:t>8/16/2015</a:t>
+              <a:t>8/17/2015</a:t>
             </a:fld>
             <a:endParaRPr lang="en-US" dirty="0"/>
           </a:p>
@@ -1405,7 +1406,7 @@
           <a:p>
             <a:fld id="{174D01B4-0AA5-45E6-B2E6-5FA4078AEBCF}" type="datetimeFigureOut">
               <a:rPr lang="en-US" smtClean="0"/>
-              <a:t>8/16/2015</a:t>
+              <a:t>8/17/2015</a:t>
             </a:fld>
             <a:endParaRPr lang="en-US" dirty="0"/>
           </a:p>
@@ -2021,7 +2022,7 @@
           <a:p>
             <a:fld id="{7E0D914D-B099-4142-A885-11F276715148}" type="datetimeFigureOut">
               <a:rPr lang="en-US" smtClean="0"/>
-              <a:t>8/16/2015</a:t>
+              <a:t>8/17/2015</a:t>
             </a:fld>
             <a:endParaRPr lang="en-US" dirty="0"/>
           </a:p>
@@ -2875,7 +2876,7 @@
           <a:p>
             <a:fld id="{7E0D914D-B099-4142-A885-11F276715148}" type="datetimeFigureOut">
               <a:rPr lang="en-US" smtClean="0"/>
-              <a:t>8/16/2015</a:t>
+              <a:t>8/17/2015</a:t>
             </a:fld>
             <a:endParaRPr lang="en-US" dirty="0"/>
           </a:p>
@@ -3052,7 +3053,7 @@
           <a:p>
             <a:fld id="{80DBE609-F3F2-45E6-BD6A-E03A8C86C1AE}" type="datetimeFigureOut">
               <a:rPr lang="en-US" smtClean="0"/>
-              <a:t>8/16/2015</a:t>
+              <a:t>8/17/2015</a:t>
             </a:fld>
             <a:endParaRPr lang="en-US" dirty="0"/>
           </a:p>
@@ -3238,7 +3239,7 @@
           <a:p>
             <a:fld id="{7A24AD68-089C-4467-A8F3-EA2BBCA6B44E}" type="datetimeFigureOut">
               <a:rPr lang="en-US" smtClean="0"/>
-              <a:t>8/16/2015</a:t>
+              <a:t>8/17/2015</a:t>
             </a:fld>
             <a:endParaRPr lang="en-US" dirty="0"/>
           </a:p>
@@ -3414,7 +3415,7 @@
           <a:p>
             <a:fld id="{75C51FCE-E4BB-4680-8E50-3C0E348D2609}" type="datetimeFigureOut">
               <a:rPr lang="en-US" smtClean="0"/>
-              <a:t>8/16/2015</a:t>
+              <a:t>8/17/2015</a:t>
             </a:fld>
             <a:endParaRPr lang="en-US" dirty="0"/>
           </a:p>
@@ -3664,7 +3665,7 @@
           <a:p>
             <a:fld id="{8AAA073D-A903-47F8-8D16-77642FB0DF1F}" type="datetimeFigureOut">
               <a:rPr lang="en-US" smtClean="0"/>
-              <a:t>8/16/2015</a:t>
+              <a:t>8/17/2015</a:t>
             </a:fld>
             <a:endParaRPr lang="en-US" dirty="0"/>
           </a:p>
@@ -3962,7 +3963,7 @@
           <a:p>
             <a:fld id="{AB91FA40-626B-4CA1-85D0-7A9016E395BA}" type="datetimeFigureOut">
               <a:rPr lang="en-US" smtClean="0"/>
-              <a:t>8/16/2015</a:t>
+              <a:t>8/17/2015</a:t>
             </a:fld>
             <a:endParaRPr lang="en-US" dirty="0"/>
           </a:p>
@@ -4406,7 +4407,7 @@
           <a:p>
             <a:fld id="{C3F425EA-B9DC-48A7-991E-9A82573B1B21}" type="datetimeFigureOut">
               <a:rPr lang="en-US" smtClean="0"/>
-              <a:t>8/16/2015</a:t>
+              <a:t>8/17/2015</a:t>
             </a:fld>
             <a:endParaRPr lang="en-US" dirty="0"/>
           </a:p>
@@ -4530,7 +4531,7 @@
           <a:p>
             <a:fld id="{66CB97F8-6CEB-469B-AFCC-889F2A2B1D5A}" type="datetimeFigureOut">
               <a:rPr lang="en-US" smtClean="0"/>
-              <a:t>8/16/2015</a:t>
+              <a:t>8/17/2015</a:t>
             </a:fld>
             <a:endParaRPr lang="en-US" dirty="0"/>
           </a:p>
@@ -4631,7 +4632,7 @@
           <a:p>
             <a:fld id="{8FA9179F-009E-4FA5-B091-7EBB82A185BD}" type="datetimeFigureOut">
               <a:rPr lang="en-US" smtClean="0"/>
-              <a:t>8/16/2015</a:t>
+              <a:t>8/17/2015</a:t>
             </a:fld>
             <a:endParaRPr lang="en-US" dirty="0"/>
           </a:p>
@@ -4916,7 +4917,7 @@
           <a:p>
             <a:fld id="{8E665CEB-0076-4E37-B880-BCEA9784DE0A}" type="datetimeFigureOut">
               <a:rPr lang="en-US" smtClean="0"/>
-              <a:t>8/16/2015</a:t>
+              <a:t>8/17/2015</a:t>
             </a:fld>
             <a:endParaRPr lang="en-US" dirty="0"/>
           </a:p>
@@ -5197,7 +5198,7 @@
           <a:p>
             <a:fld id="{A6149E5E-3896-4118-99A7-7B85668F1C5E}" type="datetimeFigureOut">
               <a:rPr lang="en-US" smtClean="0"/>
-              <a:t>8/16/2015</a:t>
+              <a:t>8/17/2015</a:t>
             </a:fld>
             <a:endParaRPr lang="en-US" dirty="0"/>
           </a:p>
@@ -5632,7 +5633,7 @@
           <a:p>
             <a:fld id="{7E0D914D-B099-4142-A885-11F276715148}" type="datetimeFigureOut">
               <a:rPr lang="en-US" smtClean="0"/>
-              <a:t>8/16/2015</a:t>
+              <a:t>8/17/2015</a:t>
             </a:fld>
             <a:endParaRPr lang="en-US" dirty="0"/>
           </a:p>
@@ -6270,6 +6271,13 @@
   <p:clrMapOvr>
     <a:masterClrMapping/>
   </p:clrMapOvr>
+  <p:timing>
+    <p:tnLst>
+      <p:par>
+        <p:cTn id="1" dur="indefinite" restart="never" nodeType="tmRoot"/>
+      </p:par>
+    </p:tnLst>
+  </p:timing>
 </p:sld>
 </file>
 
@@ -6329,7 +6337,7 @@
         <p:spPr>
           <a:xfrm>
             <a:off x="400050" y="1393750"/>
-            <a:ext cx="11791950" cy="1200329"/>
+            <a:ext cx="11791950" cy="1754326"/>
           </a:xfrm>
           <a:prstGeom prst="rect">
             <a:avLst/>
@@ -6343,14 +6351,32 @@
           <a:lstStyle/>
           <a:p>
             <a:r>
+              <a:rPr lang="en-US" sz="3600" dirty="0"/>
+              <a:t>-</a:t>
+            </a:r>
+            <a:r>
               <a:rPr lang="en-US" sz="3600" dirty="0" smtClean="0"/>
-              <a:t>+ convenience, easy to use</a:t>
+              <a:t> Users : </a:t>
             </a:r>
           </a:p>
           <a:p>
             <a:r>
               <a:rPr lang="en-US" sz="3600" dirty="0" smtClean="0"/>
-              <a:t>+ save </a:t>
+              <a:t>+ Convenience</a:t>
+            </a:r>
+            <a:r>
+              <a:rPr lang="en-US" sz="3600" dirty="0" smtClean="0"/>
+              <a:t>, easy to use</a:t>
+            </a:r>
+          </a:p>
+          <a:p>
+            <a:r>
+              <a:rPr lang="en-US" sz="3600" dirty="0" smtClean="0"/>
+              <a:t>+ </a:t>
+            </a:r>
+            <a:r>
+              <a:rPr lang="en-US" sz="3600" dirty="0" smtClean="0"/>
+              <a:t>Save </a:t>
             </a:r>
             <a:r>
               <a:rPr lang="en-US" sz="3600" dirty="0"/>
@@ -6372,8 +6398,8 @@
         </p:nvSpPr>
         <p:spPr>
           <a:xfrm>
-            <a:off x="400050" y="3014866"/>
-            <a:ext cx="11791950" cy="1200329"/>
+            <a:off x="400050" y="4001455"/>
+            <a:ext cx="11791950" cy="1754326"/>
           </a:xfrm>
           <a:prstGeom prst="rect">
             <a:avLst/>
@@ -6392,17 +6418,28 @@
             </a:pPr>
             <a:r>
               <a:rPr lang="en-US" sz="3600" dirty="0" smtClean="0"/>
-              <a:t>Copyright owner: hurt their sale.</a:t>
-            </a:r>
-          </a:p>
-          <a:p>
-            <a:pPr marL="571500" indent="-571500">
-              <a:buFontTx/>
-              <a:buChar char="-"/>
-            </a:pPr>
+              <a:t>Copyright owners:</a:t>
+            </a:r>
+            <a:endParaRPr lang="en-US" sz="3600" dirty="0" smtClean="0"/>
+          </a:p>
+          <a:p>
             <a:r>
               <a:rPr lang="en-US" sz="3600" dirty="0" smtClean="0"/>
-              <a:t>ISP: consume a lot of bandwidth</a:t>
+              <a:t>+ Hurt </a:t>
+            </a:r>
+            <a:r>
+              <a:rPr lang="en-US" sz="3600" dirty="0" smtClean="0"/>
+              <a:t>their sale.</a:t>
+            </a:r>
+          </a:p>
+          <a:p>
+            <a:r>
+              <a:rPr lang="en-US" sz="3600" dirty="0" smtClean="0"/>
+              <a:t>+ ISP</a:t>
+            </a:r>
+            <a:r>
+              <a:rPr lang="en-US" sz="3600" dirty="0" smtClean="0"/>
+              <a:t>: consume a lot of bandwidth</a:t>
             </a:r>
             <a:endParaRPr lang="en-US" sz="3600" dirty="0"/>
           </a:p>
@@ -6488,7 +6525,7 @@
         <p:spPr>
           <a:xfrm>
             <a:off x="612608" y="1355008"/>
-            <a:ext cx="6112042" cy="1569660"/>
+            <a:ext cx="9722518" cy="584775"/>
           </a:xfrm>
           <a:prstGeom prst="rect">
             <a:avLst/>
@@ -6511,7 +6548,7 @@
             </a:r>
             <a:r>
               <a:rPr lang="en-US" sz="3200" dirty="0" smtClean="0"/>
-              <a:t>: it is legal for personal use copyrighted material </a:t>
+              <a:t>:    personal use</a:t>
             </a:r>
             <a:endParaRPr lang="en-US" sz="3200" dirty="0"/>
           </a:p>
@@ -6525,8 +6562,8 @@
         </p:nvSpPr>
         <p:spPr>
           <a:xfrm>
-            <a:off x="613610" y="3267983"/>
-            <a:ext cx="11165305" cy="1569660"/>
+            <a:off x="612608" y="2738594"/>
+            <a:ext cx="11165305" cy="1077218"/>
           </a:xfrm>
           <a:prstGeom prst="rect">
             <a:avLst/>
@@ -6545,7 +6582,7 @@
             </a:r>
             <a:r>
               <a:rPr lang="en-US" sz="3200" i="1" dirty="0" smtClean="0"/>
-              <a:t>Vietnam: people are used to use copyrighted material for free, not only for personal use but for commerce (such as sell DVD for profit).</a:t>
+              <a:t>Vietnam:  personal use + commerce (such as sell DVD for profit).</a:t>
             </a:r>
             <a:r>
               <a:rPr lang="en-US" sz="3200" i="1" dirty="0"/>
@@ -6563,8 +6600,8 @@
         </p:nvSpPr>
         <p:spPr>
           <a:xfrm>
-            <a:off x="612608" y="5219688"/>
-            <a:ext cx="8951494" cy="1077218"/>
+            <a:off x="528387" y="4614623"/>
+            <a:ext cx="8951494" cy="584775"/>
           </a:xfrm>
           <a:prstGeom prst="rect">
             <a:avLst/>
@@ -6578,8 +6615,16 @@
           <a:lstStyle/>
           <a:p>
             <a:r>
+              <a:rPr lang="en-US" sz="3200" dirty="0"/>
+              <a:t>+</a:t>
+            </a:r>
+            <a:r>
               <a:rPr lang="en-US" sz="3200" dirty="0" smtClean="0"/>
-              <a:t>- Canada, US, UK :illegal to download copyrighted material </a:t>
+              <a:t> </a:t>
+            </a:r>
+            <a:r>
+              <a:rPr lang="en-US" sz="3200" dirty="0" smtClean="0"/>
+              <a:t>Canada, US, UK :   illegal</a:t>
             </a:r>
             <a:endParaRPr lang="en-US" sz="3200" dirty="0"/>
           </a:p>
@@ -6646,7 +6691,11 @@
           <a:p>
             <a:r>
               <a:rPr lang="en-US" sz="3200" b="1" i="1" dirty="0"/>
-              <a:t>Divine Command theory</a:t>
+              <a:t>Divine </a:t>
+            </a:r>
+            <a:r>
+              <a:rPr lang="en-US" sz="3200" b="1" i="1" dirty="0" smtClean="0"/>
+              <a:t>Command</a:t>
             </a:r>
             <a:endParaRPr lang="en-US" sz="3200" b="1" dirty="0"/>
           </a:p>
@@ -6660,7 +6709,7 @@
         </p:nvSpPr>
         <p:spPr>
           <a:xfrm>
-            <a:off x="475247" y="2909173"/>
+            <a:off x="400050" y="2355720"/>
             <a:ext cx="11165305" cy="1569660"/>
           </a:xfrm>
           <a:prstGeom prst="rect">
@@ -6726,14 +6775,14 @@
       </p:sp>
       <p:sp>
         <p:nvSpPr>
-          <p:cNvPr id="3" name="TextBox 2"/>
+          <p:cNvPr id="5" name="TextBox 4"/>
           <p:cNvSpPr txBox="1"/>
           <p:nvPr/>
         </p:nvSpPr>
         <p:spPr>
           <a:xfrm>
-            <a:off x="400050" y="1555631"/>
-            <a:ext cx="10708105" cy="1077218"/>
+            <a:off x="400050" y="4707972"/>
+            <a:ext cx="10262936" cy="1200329"/>
           </a:xfrm>
           <a:prstGeom prst="rect">
             <a:avLst/>
@@ -6747,46 +6796,8 @@
           <a:lstStyle/>
           <a:p>
             <a:r>
-              <a:rPr lang="en-US" sz="3200" dirty="0" smtClean="0"/>
-              <a:t>Many bible teach us how to treat with others’ property with we can apply to </a:t>
-            </a:r>
-            <a:r>
-              <a:rPr lang="en-US" sz="3200" dirty="0"/>
-              <a:t>intellectual </a:t>
-            </a:r>
-            <a:r>
-              <a:rPr lang="en-US" sz="3200" dirty="0" smtClean="0"/>
-              <a:t>property</a:t>
-            </a:r>
-            <a:endParaRPr lang="en-US" sz="3200" dirty="0"/>
-          </a:p>
-        </p:txBody>
-      </p:sp>
-      <p:sp>
-        <p:nvSpPr>
-          <p:cNvPr id="5" name="TextBox 4"/>
-          <p:cNvSpPr txBox="1"/>
-          <p:nvPr/>
-        </p:nvSpPr>
-        <p:spPr>
-          <a:xfrm>
-            <a:off x="400050" y="5069383"/>
-            <a:ext cx="10262936" cy="1200329"/>
-          </a:xfrm>
-          <a:prstGeom prst="rect">
-            <a:avLst/>
-          </a:prstGeom>
-          <a:noFill/>
-        </p:spPr>
-        <p:txBody>
-          <a:bodyPr wrap="square" rtlCol="0">
-            <a:spAutoFit/>
-          </a:bodyPr>
-          <a:lstStyle/>
-          <a:p>
-            <a:r>
               <a:rPr lang="en-US" sz="3600" dirty="0" smtClean="0"/>
-              <a:t>=&gt;It is wrong to download copyrighted material via </a:t>
+              <a:t>=&gt;It is wrong to download copyrighted materials via </a:t>
             </a:r>
             <a:r>
               <a:rPr lang="en-US" sz="3600" dirty="0" err="1" smtClean="0"/>
@@ -6904,8 +6915,8 @@
         </p:nvSpPr>
         <p:spPr>
           <a:xfrm>
-            <a:off x="654217" y="1629853"/>
-            <a:ext cx="10512592" cy="3046988"/>
+            <a:off x="400050" y="1840467"/>
+            <a:ext cx="10512592" cy="2062103"/>
           </a:xfrm>
           <a:prstGeom prst="rect">
             <a:avLst/>
@@ -6924,7 +6935,7 @@
             </a:r>
             <a:r>
               <a:rPr lang="en-US" sz="3200" dirty="0" smtClean="0"/>
-              <a:t>People should pay to use copyrighted material.</a:t>
+              <a:t>People should pay to use copyrighted materials.</a:t>
             </a:r>
           </a:p>
           <a:p>
@@ -6936,15 +6947,7 @@
           <a:p>
             <a:r>
               <a:rPr lang="en-US" sz="3200" dirty="0" smtClean="0"/>
-              <a:t>-If people download it via </a:t>
-            </a:r>
-            <a:r>
-              <a:rPr lang="en-US" sz="3200" dirty="0" err="1" smtClean="0"/>
-              <a:t>BitTorrent</a:t>
-            </a:r>
-            <a:r>
-              <a:rPr lang="en-US" sz="3200" dirty="0" smtClean="0"/>
-              <a:t>, they use the creator at the mean to the end (a way to get material for free).  </a:t>
+              <a:t>-People use the creators at the mean to the end</a:t>
             </a:r>
           </a:p>
         </p:txBody>
@@ -7061,7 +7064,7 @@
         <p:spPr>
           <a:xfrm>
             <a:off x="654217" y="1629853"/>
-            <a:ext cx="10512592" cy="5078313"/>
+            <a:ext cx="10512592" cy="4524315"/>
           </a:xfrm>
           <a:prstGeom prst="rect">
             <a:avLst/>
@@ -7075,39 +7078,70 @@
           <a:lstStyle/>
           <a:p>
             <a:r>
-              <a:rPr lang="en-US" sz="3600" dirty="0" smtClean="0"/>
-              <a:t>-Someone share publicly copyrighted material for free via </a:t>
-            </a:r>
-            <a:r>
-              <a:rPr lang="en-US" sz="3600" dirty="0" err="1" smtClean="0"/>
-              <a:t>BitTorrent</a:t>
-            </a:r>
-            <a:r>
-              <a:rPr lang="en-US" sz="3600" dirty="0" smtClean="0"/>
+              <a:rPr lang="en-US" sz="3200" dirty="0" smtClean="0"/>
+              <a:t>-The case: sharing a movie using </a:t>
+            </a:r>
+            <a:r>
+              <a:rPr lang="en-US" sz="3200" dirty="0" err="1" smtClean="0"/>
+              <a:t>Bittorrent</a:t>
+            </a:r>
+            <a:r>
+              <a:rPr lang="en-US" sz="3200" dirty="0" smtClean="0"/>
               <a:t>.</a:t>
             </a:r>
           </a:p>
           <a:p>
-            <a:endParaRPr lang="en-US" sz="3600" dirty="0" smtClean="0"/>
-          </a:p>
-          <a:p>
-            <a:r>
-              <a:rPr lang="en-US" sz="3600" dirty="0" smtClean="0"/>
-              <a:t>-Benefit: People  download for free without buy. =&gt; save some money  </a:t>
-            </a:r>
-          </a:p>
-          <a:p>
-            <a:r>
-              <a:rPr lang="en-US" sz="3600" dirty="0" smtClean="0"/>
-              <a:t>-Harm: Copyrighted owner can’t sell product =&gt; some people loss job.</a:t>
-            </a:r>
-          </a:p>
-          <a:p>
-            <a:endParaRPr lang="en-US" sz="3600" dirty="0"/>
-          </a:p>
-          <a:p>
-            <a:r>
-              <a:rPr lang="en-US" sz="3600" dirty="0" smtClean="0"/>
+            <a:endParaRPr lang="en-US" sz="3200" dirty="0" smtClean="0"/>
+          </a:p>
+          <a:p>
+            <a:r>
+              <a:rPr lang="en-US" sz="3200" dirty="0" smtClean="0"/>
+              <a:t>-Benefit: Free</a:t>
+            </a:r>
+          </a:p>
+          <a:p>
+            <a:r>
+              <a:rPr lang="en-US" sz="3200" dirty="0" smtClean="0"/>
+              <a:t>-Harm: </a:t>
+            </a:r>
+          </a:p>
+          <a:p>
+            <a:r>
+              <a:rPr lang="en-US" sz="3200" dirty="0" smtClean="0"/>
+              <a:t>+ </a:t>
+            </a:r>
+            <a:r>
+              <a:rPr lang="en-US" sz="3200" dirty="0" smtClean="0"/>
+              <a:t>Companies, cinemas… </a:t>
+            </a:r>
+            <a:r>
+              <a:rPr lang="en-US" sz="3200" dirty="0" smtClean="0"/>
+              <a:t>lose </a:t>
+            </a:r>
+            <a:r>
+              <a:rPr lang="en-US" sz="3200" dirty="0" smtClean="0"/>
+              <a:t>their profits </a:t>
+            </a:r>
+            <a:endParaRPr lang="en-US" sz="3200" dirty="0" smtClean="0"/>
+          </a:p>
+          <a:p>
+            <a:r>
+              <a:rPr lang="en-US" sz="3200" dirty="0" smtClean="0"/>
+              <a:t>+ Unemployment</a:t>
+            </a:r>
+          </a:p>
+          <a:p>
+            <a:r>
+              <a:rPr lang="en-US" sz="3200" dirty="0" smtClean="0"/>
+              <a:t>+ Effects of economy</a:t>
+            </a:r>
+          </a:p>
+          <a:p>
+            <a:endParaRPr lang="en-US" sz="3200" dirty="0"/>
+          </a:p>
+          <a:p>
+            <a:r>
+              <a:rPr lang="en-US" sz="3200" dirty="0" smtClean="0"/>
               <a:t>Harm &gt; Benefit =&gt; it is wrong  </a:t>
             </a:r>
           </a:p>
@@ -7229,7 +7263,7 @@
         <p:spPr>
           <a:xfrm>
             <a:off x="654217" y="1325053"/>
-            <a:ext cx="10512592" cy="5078313"/>
+            <a:ext cx="10512592" cy="4524315"/>
           </a:xfrm>
           <a:prstGeom prst="rect">
             <a:avLst/>
@@ -7243,47 +7277,66 @@
           <a:lstStyle/>
           <a:p>
             <a:r>
-              <a:rPr lang="en-US" sz="3600" dirty="0" smtClean="0"/>
-              <a:t>-Many people are used to get copyrighted material from </a:t>
-            </a:r>
-            <a:r>
-              <a:rPr lang="en-US" sz="3600" dirty="0" err="1" smtClean="0"/>
-              <a:t>BitTorent</a:t>
-            </a:r>
-            <a:endParaRPr lang="en-US" sz="3600" dirty="0" smtClean="0"/>
-          </a:p>
-          <a:p>
-            <a:endParaRPr lang="en-US" sz="3600" dirty="0" smtClean="0"/>
-          </a:p>
-          <a:p>
-            <a:r>
-              <a:rPr lang="en-US" sz="3600" dirty="0" smtClean="0"/>
-              <a:t>-Benefit: Save some money</a:t>
-            </a:r>
-          </a:p>
-          <a:p>
-            <a:endParaRPr lang="en-US" sz="3600" dirty="0" smtClean="0"/>
-          </a:p>
-          <a:p>
-            <a:r>
-              <a:rPr lang="en-US" sz="3600" dirty="0" smtClean="0"/>
-              <a:t>-Harm: No one want to </a:t>
-            </a:r>
-            <a:r>
-              <a:rPr lang="en-US" sz="3600" dirty="0"/>
-              <a:t>create intellectual </a:t>
-            </a:r>
-            <a:r>
-              <a:rPr lang="en-US" sz="3600" dirty="0" smtClean="0"/>
-              <a:t>property. </a:t>
-            </a:r>
-          </a:p>
-          <a:p>
-            <a:endParaRPr lang="en-US" sz="3600" dirty="0"/>
-          </a:p>
-          <a:p>
-            <a:r>
-              <a:rPr lang="en-US" sz="3600" dirty="0" smtClean="0"/>
+              <a:rPr lang="en-US" sz="3200" dirty="0"/>
+              <a:t> </a:t>
+            </a:r>
+            <a:r>
+              <a:rPr lang="en-US" sz="3200" dirty="0" smtClean="0"/>
+              <a:t>If </a:t>
+            </a:r>
+            <a:r>
+              <a:rPr lang="en-US" sz="3200" dirty="0"/>
+              <a:t>t</a:t>
+            </a:r>
+            <a:r>
+              <a:rPr lang="en-US" sz="3200" dirty="0" smtClean="0"/>
+              <a:t>his action is followed by everyone:</a:t>
+            </a:r>
+          </a:p>
+          <a:p>
+            <a:endParaRPr lang="en-US" sz="3200" dirty="0" smtClean="0"/>
+          </a:p>
+          <a:p>
+            <a:r>
+              <a:rPr lang="en-US" sz="3200" dirty="0" smtClean="0"/>
+              <a:t>-Benefit: Save some money.</a:t>
+            </a:r>
+          </a:p>
+          <a:p>
+            <a:endParaRPr lang="en-US" sz="3200" dirty="0" smtClean="0"/>
+          </a:p>
+          <a:p>
+            <a:r>
+              <a:rPr lang="en-US" sz="3200" dirty="0" smtClean="0"/>
+              <a:t>-Harm: </a:t>
+            </a:r>
+          </a:p>
+          <a:p>
+            <a:r>
+              <a:rPr lang="en-US" sz="3200" dirty="0" smtClean="0"/>
+              <a:t>+ Affect creators’ profits.</a:t>
+            </a:r>
+          </a:p>
+          <a:p>
+            <a:r>
+              <a:rPr lang="en-US" sz="3200" dirty="0" smtClean="0"/>
+              <a:t>+ </a:t>
+            </a:r>
+            <a:r>
+              <a:rPr lang="en-US" sz="3200" dirty="0"/>
+              <a:t>No one wants to </a:t>
+            </a:r>
+            <a:r>
+              <a:rPr lang="en-US" sz="3200" dirty="0" smtClean="0"/>
+              <a:t>create new products.</a:t>
+            </a:r>
+          </a:p>
+          <a:p>
+            <a:endParaRPr lang="en-US" sz="3200" dirty="0"/>
+          </a:p>
+          <a:p>
+            <a:r>
+              <a:rPr lang="en-US" sz="3200" dirty="0" smtClean="0"/>
               <a:t>Harm &gt; Benefit =&gt; it is wrong  </a:t>
             </a:r>
           </a:p>
@@ -7326,6 +7379,102 @@
           <a:chExt cx="0" cy="0"/>
         </a:xfrm>
       </p:grpSpPr>
+      <p:sp>
+        <p:nvSpPr>
+          <p:cNvPr id="2" name="Title 1"/>
+          <p:cNvSpPr>
+            <a:spLocks noGrp="1"/>
+          </p:cNvSpPr>
+          <p:nvPr>
+            <p:ph type="title"/>
+          </p:nvPr>
+        </p:nvSpPr>
+        <p:spPr/>
+        <p:txBody>
+          <a:bodyPr/>
+          <a:lstStyle/>
+          <a:p>
+            <a:r>
+              <a:rPr lang="en-US" dirty="0" smtClean="0"/>
+              <a:t>Social Contract</a:t>
+            </a:r>
+            <a:endParaRPr lang="en-US" dirty="0"/>
+          </a:p>
+        </p:txBody>
+      </p:sp>
+      <p:sp>
+        <p:nvSpPr>
+          <p:cNvPr id="4" name="Content Placeholder 3"/>
+          <p:cNvSpPr>
+            <a:spLocks noGrp="1"/>
+          </p:cNvSpPr>
+          <p:nvPr>
+            <p:ph idx="1"/>
+          </p:nvPr>
+        </p:nvSpPr>
+        <p:spPr>
+          <a:xfrm>
+            <a:off x="1103312" y="1491916"/>
+            <a:ext cx="8946541" cy="4756483"/>
+          </a:xfrm>
+        </p:spPr>
+        <p:txBody>
+          <a:bodyPr>
+            <a:normAutofit/>
+          </a:bodyPr>
+          <a:lstStyle/>
+          <a:p>
+            <a:r>
+              <a:rPr lang="en-US" sz="3200" dirty="0" smtClean="0"/>
+              <a:t>- A </a:t>
+            </a:r>
+            <a:r>
+              <a:rPr lang="en-US" sz="3200" dirty="0"/>
+              <a:t>voluntary agreement between </a:t>
+            </a:r>
+            <a:r>
+              <a:rPr lang="en-US" sz="3200" dirty="0" smtClean="0"/>
+              <a:t>individuals for </a:t>
+            </a:r>
+            <a:r>
+              <a:rPr lang="en-US" sz="3200" dirty="0"/>
+              <a:t>their mutual </a:t>
+            </a:r>
+            <a:r>
+              <a:rPr lang="en-US" sz="3200" dirty="0" smtClean="0"/>
+              <a:t>benefit []</a:t>
+            </a:r>
+          </a:p>
+          <a:p>
+            <a:endParaRPr lang="en-US" sz="3200" dirty="0" smtClean="0"/>
+          </a:p>
+          <a:p>
+            <a:r>
+              <a:rPr lang="en-US" sz="3200" dirty="0" smtClean="0"/>
+              <a:t>- Consider the case:  a novelist</a:t>
+            </a:r>
+          </a:p>
+          <a:p>
+            <a:r>
+              <a:rPr lang="en-US" sz="3200" dirty="0" smtClean="0"/>
+              <a:t>+ what does he have in return?</a:t>
+            </a:r>
+          </a:p>
+          <a:p>
+            <a:r>
+              <a:rPr lang="en-US" sz="3200" dirty="0" smtClean="0"/>
+              <a:t>+ what do readers have to do? </a:t>
+            </a:r>
+          </a:p>
+          <a:p>
+            <a:r>
+              <a:rPr lang="en-US" sz="3200" dirty="0" smtClean="0"/>
+              <a:t>What if they break the rule.</a:t>
+            </a:r>
+            <a:endParaRPr lang="en-US" sz="3200" dirty="0"/>
+          </a:p>
+        </p:txBody>
+      </p:sp>
     </p:spTree>
     <p:extLst>
       <p:ext uri="{BB962C8B-B14F-4D97-AF65-F5344CB8AC3E}">
@@ -7336,6 +7485,118 @@
   <p:clrMapOvr>
     <a:masterClrMapping/>
   </p:clrMapOvr>
+  <p:timing>
+    <p:tnLst>
+      <p:par>
+        <p:cTn id="1" dur="indefinite" restart="never" nodeType="tmRoot"/>
+      </p:par>
+    </p:tnLst>
+  </p:timing>
+</p:sld>
+</file>
+
+<file path=ppt/slides/slide18.xml><?xml version="1.0" encoding="utf-8"?>
+<p:sld xmlns:a="http://schemas.openxmlformats.org/drawingml/2006/main" xmlns:r="http://schemas.openxmlformats.org/officeDocument/2006/relationships" xmlns:p="http://schemas.openxmlformats.org/presentationml/2006/main">
+  <p:cSld>
+    <p:spTree>
+      <p:nvGrpSpPr>
+        <p:cNvPr id="1" name=""/>
+        <p:cNvGrpSpPr/>
+        <p:nvPr/>
+      </p:nvGrpSpPr>
+      <p:grpSpPr>
+        <a:xfrm>
+          <a:off x="0" y="0"/>
+          <a:ext cx="0" cy="0"/>
+          <a:chOff x="0" y="0"/>
+          <a:chExt cx="0" cy="0"/>
+        </a:xfrm>
+      </p:grpSpPr>
+      <p:sp>
+        <p:nvSpPr>
+          <p:cNvPr id="2" name="Title 1"/>
+          <p:cNvSpPr>
+            <a:spLocks noGrp="1"/>
+          </p:cNvSpPr>
+          <p:nvPr>
+            <p:ph type="title"/>
+          </p:nvPr>
+        </p:nvSpPr>
+        <p:spPr/>
+        <p:txBody>
+          <a:bodyPr/>
+          <a:lstStyle/>
+          <a:p>
+            <a:r>
+              <a:rPr lang="en-US" dirty="0" smtClean="0"/>
+              <a:t>Conclusion </a:t>
+            </a:r>
+            <a:endParaRPr lang="en-US" dirty="0"/>
+          </a:p>
+        </p:txBody>
+      </p:sp>
+      <p:sp>
+        <p:nvSpPr>
+          <p:cNvPr id="3" name="Content Placeholder 2"/>
+          <p:cNvSpPr>
+            <a:spLocks noGrp="1"/>
+          </p:cNvSpPr>
+          <p:nvPr>
+            <p:ph idx="1"/>
+          </p:nvPr>
+        </p:nvSpPr>
+        <p:spPr/>
+        <p:txBody>
+          <a:bodyPr>
+            <a:normAutofit/>
+          </a:bodyPr>
+          <a:lstStyle/>
+          <a:p>
+            <a:endParaRPr lang="en-US" sz="3200" dirty="0" smtClean="0"/>
+          </a:p>
+          <a:p>
+            <a:r>
+              <a:rPr lang="en-US" sz="3200" dirty="0" smtClean="0"/>
+              <a:t>+ Downloading or sharing copyrighted contents -&gt; illegal </a:t>
+            </a:r>
+          </a:p>
+          <a:p>
+            <a:endParaRPr lang="en-US" sz="3200" dirty="0"/>
+          </a:p>
+          <a:p>
+            <a:r>
+              <a:rPr lang="en-US" sz="3200" dirty="0" smtClean="0"/>
+              <a:t>=&gt; </a:t>
+            </a:r>
+            <a:r>
+              <a:rPr lang="en-US" sz="3200" dirty="0" err="1" smtClean="0"/>
+              <a:t>Bittorrent</a:t>
+            </a:r>
+            <a:r>
+              <a:rPr lang="en-US" sz="3200" dirty="0" smtClean="0"/>
+              <a:t> is legal, the ways people uses it is illegal.</a:t>
+            </a:r>
+            <a:endParaRPr lang="en-US" sz="3200" dirty="0"/>
+          </a:p>
+        </p:txBody>
+      </p:sp>
+    </p:spTree>
+    <p:extLst>
+      <p:ext uri="{BB962C8B-B14F-4D97-AF65-F5344CB8AC3E}">
+        <p14:creationId xmlns:p14="http://schemas.microsoft.com/office/powerpoint/2010/main" val="1238642013"/>
+      </p:ext>
+    </p:extLst>
+  </p:cSld>
+  <p:clrMapOvr>
+    <a:masterClrMapping/>
+  </p:clrMapOvr>
+  <p:timing>
+    <p:tnLst>
+      <p:par>
+        <p:cTn id="1" dur="indefinite" restart="never" nodeType="tmRoot"/>
+      </p:par>
+    </p:tnLst>
+  </p:timing>
 </p:sld>
 </file>
 
@@ -7393,13 +7654,8 @@
             </a:r>
             <a:r>
               <a:rPr lang="en-US" sz="6000" dirty="0"/>
-              <a:t> in </a:t>
-            </a:r>
-            <a:r>
-              <a:rPr lang="en-US" sz="6000" dirty="0" smtClean="0"/>
-              <a:t>Vietnam</a:t>
-            </a:r>
-            <a:endParaRPr lang="en-US" sz="6000" dirty="0"/>
+              <a:t> </a:t>
+            </a:r>
           </a:p>
         </p:txBody>
       </p:sp>
@@ -7732,7 +7988,7 @@
         <p:spPr>
           <a:xfrm>
             <a:off x="517358" y="3598260"/>
-            <a:ext cx="11321716" cy="2031325"/>
+            <a:ext cx="11321716" cy="1477328"/>
           </a:xfrm>
           <a:prstGeom prst="rect">
             <a:avLst/>
@@ -7750,8 +8006,12 @@
               <a:buChar char="•"/>
             </a:pPr>
             <a:r>
+              <a:rPr lang="en-US" sz="3600" dirty="0"/>
+              <a:t>T</a:t>
+            </a:r>
+            <a:r>
               <a:rPr lang="en-US" sz="3600" dirty="0" smtClean="0"/>
-              <a:t>As the society growth, the </a:t>
+              <a:t>he </a:t>
             </a:r>
             <a:r>
               <a:rPr lang="en-US" sz="3600" dirty="0"/>
@@ -7763,11 +8023,11 @@
             </a:r>
             <a:r>
               <a:rPr lang="en-US" sz="3600" dirty="0"/>
-              <a:t>people through the use of Internet does </a:t>
+              <a:t>people through the use of </a:t>
             </a:r>
             <a:r>
               <a:rPr lang="en-US" sz="3600" dirty="0" smtClean="0"/>
-              <a:t>also increase</a:t>
+              <a:t>Internet increase.</a:t>
             </a:r>
             <a:r>
               <a:rPr lang="en-US" dirty="0"/>
@@ -7866,7 +8126,7 @@
         <p:spPr>
           <a:xfrm>
             <a:off x="558967" y="1524000"/>
-            <a:ext cx="10477500" cy="2308324"/>
+            <a:ext cx="10477500" cy="1200329"/>
           </a:xfrm>
           <a:prstGeom prst="rect">
             <a:avLst/>
@@ -7889,7 +8149,7 @@
             </a:pPr>
             <a:r>
               <a:rPr lang="en-US" sz="3600" dirty="0" smtClean="0"/>
-              <a:t>Due to disadvantages of Client-Server networking, peer-to-peer networking was invented.</a:t>
+              <a:t>Peer-to-peer networking was invented.</a:t>
             </a:r>
             <a:r>
               <a:rPr lang="en-US" sz="3600" dirty="0"/>
@@ -7938,7 +8198,7 @@
             </a:r>
             <a:r>
               <a:rPr lang="en-US" sz="3600" dirty="0" smtClean="0"/>
-              <a:t> was used to shared copyright material.</a:t>
+              <a:t> was used to shared copyrighted materials.</a:t>
             </a:r>
             <a:endParaRPr lang="en-US" sz="3600" dirty="0"/>
           </a:p>
@@ -8055,11 +8315,7 @@
             </a:r>
             <a:r>
               <a:rPr lang="en-US" sz="4000" dirty="0" smtClean="0"/>
-              <a:t>using </a:t>
-            </a:r>
-            <a:r>
-              <a:rPr lang="en-US" sz="4000" dirty="0" smtClean="0"/>
-              <a:t>theories and principles of ethics.</a:t>
+              <a:t>using theories and principles of ethics.</a:t>
             </a:r>
             <a:endParaRPr lang="en-US" sz="4000" dirty="0"/>
           </a:p>
@@ -8485,6 +8741,120 @@
           </a:prstGeom>
         </p:spPr>
       </p:pic>
+      <p:sp>
+        <p:nvSpPr>
+          <p:cNvPr id="2" name="TextBox 1"/>
+          <p:cNvSpPr txBox="1"/>
+          <p:nvPr/>
+        </p:nvSpPr>
+        <p:spPr>
+          <a:xfrm>
+            <a:off x="152400" y="6324599"/>
+            <a:ext cx="10254916" cy="369332"/>
+          </a:xfrm>
+          <a:prstGeom prst="rect">
+            <a:avLst/>
+          </a:prstGeom>
+          <a:noFill/>
+        </p:spPr>
+        <p:txBody>
+          <a:bodyPr wrap="square" rtlCol="0">
+            <a:spAutoFit/>
+          </a:bodyPr>
+          <a:lstStyle/>
+          <a:p>
+            <a:r>
+              <a:rPr lang="en-US" dirty="0"/>
+              <a:t>https://dougvitale.files.wordpress.com/2012/02/bittorrent-network-flow2.gif?w=700</a:t>
+            </a:r>
+          </a:p>
+        </p:txBody>
+      </p:sp>
+      <p:sp>
+        <p:nvSpPr>
+          <p:cNvPr id="5" name="TextBox 4"/>
+          <p:cNvSpPr txBox="1"/>
+          <p:nvPr/>
+        </p:nvSpPr>
+        <p:spPr>
+          <a:xfrm>
+            <a:off x="8858250" y="1324877"/>
+            <a:ext cx="3144253" cy="3785652"/>
+          </a:xfrm>
+          <a:prstGeom prst="rect">
+            <a:avLst/>
+          </a:prstGeom>
+          <a:noFill/>
+        </p:spPr>
+        <p:txBody>
+          <a:bodyPr wrap="square" rtlCol="0">
+            <a:spAutoFit/>
+          </a:bodyPr>
+          <a:lstStyle/>
+          <a:p>
+            <a:pPr marL="285750" indent="-285750">
+              <a:buFont typeface="Arial" panose="020B0604020202020204" pitchFamily="34" charset="0"/>
+              <a:buChar char="•"/>
+            </a:pPr>
+            <a:r>
+              <a:rPr lang="en-US" sz="2400" dirty="0" smtClean="0"/>
+              <a:t>Get .torrent from torrent site</a:t>
+            </a:r>
+          </a:p>
+          <a:p>
+            <a:pPr marL="285750" indent="-285750">
+              <a:buFont typeface="Arial" panose="020B0604020202020204" pitchFamily="34" charset="0"/>
+              <a:buChar char="•"/>
+            </a:pPr>
+            <a:endParaRPr lang="en-US" sz="2400" dirty="0" smtClean="0"/>
+          </a:p>
+          <a:p>
+            <a:pPr marL="285750" indent="-285750">
+              <a:buFont typeface="Arial" panose="020B0604020202020204" pitchFamily="34" charset="0"/>
+              <a:buChar char="•"/>
+            </a:pPr>
+            <a:r>
+              <a:rPr lang="en-US" sz="2400" dirty="0" smtClean="0"/>
+              <a:t>Get peer info from tracker</a:t>
+            </a:r>
+          </a:p>
+          <a:p>
+            <a:pPr marL="285750" indent="-285750">
+              <a:buFont typeface="Arial" panose="020B0604020202020204" pitchFamily="34" charset="0"/>
+              <a:buChar char="•"/>
+            </a:pPr>
+            <a:endParaRPr lang="en-US" sz="2400" dirty="0" smtClean="0"/>
+          </a:p>
+          <a:p>
+            <a:pPr marL="285750" indent="-285750">
+              <a:buFont typeface="Arial" panose="020B0604020202020204" pitchFamily="34" charset="0"/>
+              <a:buChar char="•"/>
+            </a:pPr>
+            <a:r>
+              <a:rPr lang="en-US" sz="2400" dirty="0" smtClean="0"/>
+              <a:t>Connect to peers</a:t>
+            </a:r>
+          </a:p>
+          <a:p>
+            <a:pPr marL="285750" indent="-285750">
+              <a:buFont typeface="Arial" panose="020B0604020202020204" pitchFamily="34" charset="0"/>
+              <a:buChar char="•"/>
+            </a:pPr>
+            <a:endParaRPr lang="en-US" sz="2400" dirty="0" smtClean="0"/>
+          </a:p>
+          <a:p>
+            <a:pPr marL="285750" indent="-285750">
+              <a:buFont typeface="Arial" panose="020B0604020202020204" pitchFamily="34" charset="0"/>
+              <a:buChar char="•"/>
+            </a:pPr>
+            <a:r>
+              <a:rPr lang="en-US" sz="2400" dirty="0" smtClean="0"/>
+              <a:t>File are transfer between peers</a:t>
+            </a:r>
+            <a:endParaRPr lang="en-US" sz="2400" dirty="0"/>
+          </a:p>
+        </p:txBody>
+      </p:sp>
     </p:spTree>
     <p:extLst>
       <p:ext uri="{BB962C8B-B14F-4D97-AF65-F5344CB8AC3E}">

</xml_diff>